<commit_message>
UI: Generata finestra cerca titolo e autore Implementato sfondo e immagine Sherlock per empty state; fix vari
</commit_message>
<xml_diff>
--- a/Assets/SpartitiERicerca.pptx
+++ b/Assets/SpartitiERicerca.pptx
@@ -5,11 +5,12 @@
     <p:sldMasterId id="2147483648" r:id="rId1"/>
   </p:sldMasterIdLst>
   <p:notesMasterIdLst>
-    <p:notesMasterId r:id="rId4"/>
+    <p:notesMasterId r:id="rId5"/>
   </p:notesMasterIdLst>
   <p:sldIdLst>
     <p:sldId id="256" r:id="rId2"/>
-    <p:sldId id="258" r:id="rId3"/>
+    <p:sldId id="260" r:id="rId3"/>
+    <p:sldId id="258" r:id="rId4"/>
   </p:sldIdLst>
   <p:sldSz cx="12192000" cy="6858000"/>
   <p:notesSz cx="9601200" cy="7315200"/>
@@ -114,6 +115,7 @@
         <p14:section name="Sezione predefinita" id="{AAA22F07-8505-4BE6-A41E-C264DEA09250}">
           <p14:sldIdLst>
             <p14:sldId id="256"/>
+            <p14:sldId id="260"/>
           </p14:sldIdLst>
         </p14:section>
         <p14:section name="Sezione senza titolo" id="{29242930-4909-4C95-B79C-DE872149671C}">
@@ -122,6 +124,9 @@
           </p14:sldIdLst>
         </p14:section>
       </p14:sectionLst>
+    </p:ext>
+    <p:ext uri="{EFAFB233-063F-42B5-8137-9DF3F51BA10A}">
+      <p15:sldGuideLst xmlns:p15="http://schemas.microsoft.com/office/powerpoint/2012/main"/>
     </p:ext>
   </p:extLst>
 </p:presentation>
@@ -209,7 +214,7 @@
           <a:p>
             <a:fld id="{E2D785F3-3C4A-4ECD-893A-1A0A7E6856E8}" type="datetimeFigureOut">
               <a:rPr lang="it-IT" smtClean="0"/>
-              <a:t>06/09/2025</a:t>
+              <a:t>26/09/2025</a:t>
             </a:fld>
             <a:endParaRPr lang="it-IT"/>
           </a:p>
@@ -608,7 +613,7 @@
           <a:p>
             <a:fld id="{DAC644D1-B497-49A3-BAE4-D0FE99F85343}" type="datetimeFigureOut">
               <a:rPr lang="it-IT" smtClean="0"/>
-              <a:t>06/09/2025</a:t>
+              <a:t>26/09/2025</a:t>
             </a:fld>
             <a:endParaRPr lang="it-IT"/>
           </a:p>
@@ -778,7 +783,7 @@
           <a:p>
             <a:fld id="{DAC644D1-B497-49A3-BAE4-D0FE99F85343}" type="datetimeFigureOut">
               <a:rPr lang="it-IT" smtClean="0"/>
-              <a:t>06/09/2025</a:t>
+              <a:t>26/09/2025</a:t>
             </a:fld>
             <a:endParaRPr lang="it-IT"/>
           </a:p>
@@ -958,7 +963,7 @@
           <a:p>
             <a:fld id="{DAC644D1-B497-49A3-BAE4-D0FE99F85343}" type="datetimeFigureOut">
               <a:rPr lang="it-IT" smtClean="0"/>
-              <a:t>06/09/2025</a:t>
+              <a:t>26/09/2025</a:t>
             </a:fld>
             <a:endParaRPr lang="it-IT"/>
           </a:p>
@@ -1128,7 +1133,7 @@
           <a:p>
             <a:fld id="{DAC644D1-B497-49A3-BAE4-D0FE99F85343}" type="datetimeFigureOut">
               <a:rPr lang="it-IT" smtClean="0"/>
-              <a:t>06/09/2025</a:t>
+              <a:t>26/09/2025</a:t>
             </a:fld>
             <a:endParaRPr lang="it-IT"/>
           </a:p>
@@ -1374,7 +1379,7 @@
           <a:p>
             <a:fld id="{DAC644D1-B497-49A3-BAE4-D0FE99F85343}" type="datetimeFigureOut">
               <a:rPr lang="it-IT" smtClean="0"/>
-              <a:t>06/09/2025</a:t>
+              <a:t>26/09/2025</a:t>
             </a:fld>
             <a:endParaRPr lang="it-IT"/>
           </a:p>
@@ -1606,7 +1611,7 @@
           <a:p>
             <a:fld id="{DAC644D1-B497-49A3-BAE4-D0FE99F85343}" type="datetimeFigureOut">
               <a:rPr lang="it-IT" smtClean="0"/>
-              <a:t>06/09/2025</a:t>
+              <a:t>26/09/2025</a:t>
             </a:fld>
             <a:endParaRPr lang="it-IT"/>
           </a:p>
@@ -1973,7 +1978,7 @@
           <a:p>
             <a:fld id="{DAC644D1-B497-49A3-BAE4-D0FE99F85343}" type="datetimeFigureOut">
               <a:rPr lang="it-IT" smtClean="0"/>
-              <a:t>06/09/2025</a:t>
+              <a:t>26/09/2025</a:t>
             </a:fld>
             <a:endParaRPr lang="it-IT"/>
           </a:p>
@@ -2091,7 +2096,7 @@
           <a:p>
             <a:fld id="{DAC644D1-B497-49A3-BAE4-D0FE99F85343}" type="datetimeFigureOut">
               <a:rPr lang="it-IT" smtClean="0"/>
-              <a:t>06/09/2025</a:t>
+              <a:t>26/09/2025</a:t>
             </a:fld>
             <a:endParaRPr lang="it-IT"/>
           </a:p>
@@ -2186,7 +2191,7 @@
           <a:p>
             <a:fld id="{DAC644D1-B497-49A3-BAE4-D0FE99F85343}" type="datetimeFigureOut">
               <a:rPr lang="it-IT" smtClean="0"/>
-              <a:t>06/09/2025</a:t>
+              <a:t>26/09/2025</a:t>
             </a:fld>
             <a:endParaRPr lang="it-IT"/>
           </a:p>
@@ -2463,7 +2468,7 @@
           <a:p>
             <a:fld id="{DAC644D1-B497-49A3-BAE4-D0FE99F85343}" type="datetimeFigureOut">
               <a:rPr lang="it-IT" smtClean="0"/>
-              <a:t>06/09/2025</a:t>
+              <a:t>26/09/2025</a:t>
             </a:fld>
             <a:endParaRPr lang="it-IT"/>
           </a:p>
@@ -2716,7 +2721,7 @@
           <a:p>
             <a:fld id="{DAC644D1-B497-49A3-BAE4-D0FE99F85343}" type="datetimeFigureOut">
               <a:rPr lang="it-IT" smtClean="0"/>
-              <a:t>06/09/2025</a:t>
+              <a:t>26/09/2025</a:t>
             </a:fld>
             <a:endParaRPr lang="it-IT"/>
           </a:p>
@@ -2929,7 +2934,7 @@
           <a:p>
             <a:fld id="{DAC644D1-B497-49A3-BAE4-D0FE99F85343}" type="datetimeFigureOut">
               <a:rPr lang="it-IT" smtClean="0"/>
-              <a:t>06/09/2025</a:t>
+              <a:t>26/09/2025</a:t>
             </a:fld>
             <a:endParaRPr lang="it-IT"/>
           </a:p>
@@ -3342,95 +3347,16 @@
           <a:chExt cx="0" cy="0"/>
         </a:xfrm>
       </p:grpSpPr>
-      <p:sp>
-        <p:nvSpPr>
-          <p:cNvPr id="2" name="Titolo 1"/>
-          <p:cNvSpPr>
-            <a:spLocks noGrp="1"/>
-          </p:cNvSpPr>
-          <p:nvPr>
-            <p:ph type="ctrTitle"/>
-          </p:nvPr>
-        </p:nvSpPr>
-        <p:spPr/>
-        <p:txBody>
-          <a:bodyPr/>
-          <a:lstStyle/>
-          <a:p>
-            <a:endParaRPr lang="it-IT" dirty="0"/>
-          </a:p>
-        </p:txBody>
-      </p:sp>
-      <p:sp>
-        <p:nvSpPr>
-          <p:cNvPr id="3" name="Sottotitolo 2"/>
-          <p:cNvSpPr>
-            <a:spLocks noGrp="1"/>
-          </p:cNvSpPr>
-          <p:nvPr>
-            <p:ph type="subTitle" idx="1"/>
-          </p:nvPr>
-        </p:nvSpPr>
-        <p:spPr/>
-        <p:txBody>
-          <a:bodyPr/>
-          <a:lstStyle/>
-          <a:p>
-            <a:endParaRPr lang="it-IT" dirty="0"/>
-          </a:p>
-        </p:txBody>
-      </p:sp>
       <p:pic>
         <p:nvPicPr>
-          <p:cNvPr id="1026" name="Picture 2" descr="Differenza tra Motori di ricerca e Information retrieval | Informatica e  Ingegneria Online"/>
-          <p:cNvPicPr>
-            <a:picLocks noChangeAspect="1" noChangeArrowheads="1"/>
-          </p:cNvPicPr>
-          <p:nvPr/>
-        </p:nvPicPr>
-        <p:blipFill>
-          <a:blip r:embed="rId2">
-            <a:extLst>
-              <a:ext uri="{28A0092B-C50C-407E-A947-70E740481C1C}">
-                <a14:useLocalDpi xmlns:a14="http://schemas.microsoft.com/office/drawing/2010/main" val="0"/>
-              </a:ext>
-            </a:extLst>
-          </a:blip>
-          <a:srcRect/>
-          <a:stretch>
-            <a:fillRect/>
-          </a:stretch>
-        </p:blipFill>
-        <p:spPr bwMode="auto">
-          <a:xfrm>
-            <a:off x="6996942" y="219605"/>
-            <a:ext cx="5067778" cy="2847447"/>
-          </a:xfrm>
-          <a:prstGeom prst="rect">
-            <a:avLst/>
-          </a:prstGeom>
-          <a:noFill/>
-          <a:extLst>
-            <a:ext uri="{909E8E84-426E-40DD-AFC4-6F175D3DCCD1}">
-              <a14:hiddenFill xmlns:a14="http://schemas.microsoft.com/office/drawing/2010/main">
-                <a:solidFill>
-                  <a:srgbClr val="FFFFFF"/>
-                </a:solidFill>
-              </a14:hiddenFill>
-            </a:ext>
-          </a:extLst>
-        </p:spPr>
-      </p:pic>
-      <p:pic>
-        <p:nvPicPr>
-          <p:cNvPr id="4" name="Immagine 3"/>
+          <p:cNvPr id="8" name="Immagine 7"/>
           <p:cNvPicPr>
             <a:picLocks noChangeAspect="1"/>
           </p:cNvPicPr>
           <p:nvPr/>
         </p:nvPicPr>
         <p:blipFill>
-          <a:blip r:embed="rId3" cstate="print">
+          <a:blip r:embed="rId2">
             <a:extLst>
               <a:ext uri="{28A0092B-C50C-407E-A947-70E740481C1C}">
                 <a14:useLocalDpi xmlns:a14="http://schemas.microsoft.com/office/drawing/2010/main" val="0"/>
@@ -3443,68 +3369,33 @@
         </p:blipFill>
         <p:spPr>
           <a:xfrm>
-            <a:off x="-268578" y="4702205"/>
-            <a:ext cx="5576767" cy="2510606"/>
+            <a:off x="509375" y="0"/>
+            <a:ext cx="11251057" cy="6300592"/>
           </a:xfrm>
           <a:prstGeom prst="rect">
             <a:avLst/>
           </a:prstGeom>
         </p:spPr>
       </p:pic>
-      <p:pic>
-        <p:nvPicPr>
-          <p:cNvPr id="7" name="Immagine 6"/>
-          <p:cNvPicPr>
-            <a:picLocks noChangeAspect="1"/>
-          </p:cNvPicPr>
-          <p:nvPr/>
-        </p:nvPicPr>
-        <p:blipFill>
-          <a:blip r:embed="rId4"/>
-          <a:stretch>
-            <a:fillRect/>
-          </a:stretch>
-        </p:blipFill>
-        <p:spPr>
-          <a:xfrm>
-            <a:off x="2074" y="414425"/>
-            <a:ext cx="6480250" cy="2661600"/>
-          </a:xfrm>
-          <a:prstGeom prst="rect">
-            <a:avLst/>
-          </a:prstGeom>
-        </p:spPr>
-      </p:pic>
-      <p:pic>
-        <p:nvPicPr>
-          <p:cNvPr id="8" name="Immagine 7"/>
-          <p:cNvPicPr>
-            <a:picLocks noChangeAspect="1"/>
-          </p:cNvPicPr>
-          <p:nvPr/>
-        </p:nvPicPr>
-        <p:blipFill>
-          <a:blip r:embed="rId5">
-            <a:extLst>
-              <a:ext uri="{28A0092B-C50C-407E-A947-70E740481C1C}">
-                <a14:useLocalDpi xmlns:a14="http://schemas.microsoft.com/office/drawing/2010/main" val="0"/>
-              </a:ext>
-            </a:extLst>
-          </a:blip>
-          <a:stretch>
-            <a:fillRect/>
-          </a:stretch>
-        </p:blipFill>
-        <p:spPr>
-          <a:xfrm>
-            <a:off x="5739018" y="3601106"/>
-            <a:ext cx="6829823" cy="3824701"/>
-          </a:xfrm>
-          <a:prstGeom prst="rect">
-            <a:avLst/>
-          </a:prstGeom>
-        </p:spPr>
-      </p:pic>
+      <p:sp>
+        <p:nvSpPr>
+          <p:cNvPr id="3" name="Sottotitolo 2"/>
+          <p:cNvSpPr>
+            <a:spLocks noGrp="1"/>
+          </p:cNvSpPr>
+          <p:nvPr>
+            <p:ph type="subTitle" idx="1"/>
+          </p:nvPr>
+        </p:nvSpPr>
+        <p:spPr/>
+        <p:txBody>
+          <a:bodyPr/>
+          <a:lstStyle/>
+          <a:p>
+            <a:endParaRPr lang="it-IT" dirty="0"/>
+          </a:p>
+        </p:txBody>
+      </p:sp>
       <p:pic>
         <p:nvPicPr>
           <p:cNvPr id="9" name="Immagine 8"/>
@@ -3514,7 +3405,7 @@
           <p:nvPr/>
         </p:nvPicPr>
         <p:blipFill>
-          <a:blip r:embed="rId6"/>
+          <a:blip r:embed="rId3"/>
           <a:stretch>
             <a:fillRect/>
           </a:stretch>
@@ -3529,196 +3420,105 @@
           </a:prstGeom>
         </p:spPr>
       </p:pic>
-      <p:sp>
-        <p:nvSpPr>
-          <p:cNvPr id="10" name="Freccia a destra 9"/>
-          <p:cNvSpPr/>
+      <p:grpSp>
+        <p:nvGrpSpPr>
+          <p:cNvPr id="5" name="Gruppo 4"/>
+          <p:cNvGrpSpPr/>
           <p:nvPr/>
-        </p:nvSpPr>
-        <p:spPr>
-          <a:xfrm rot="20785927">
-            <a:off x="5655804" y="2005210"/>
-            <a:ext cx="2590389" cy="302172"/>
+        </p:nvGrpSpPr>
+        <p:grpSpPr>
+          <a:xfrm>
+            <a:off x="473621" y="5178484"/>
+            <a:ext cx="11283961" cy="1679516"/>
+            <a:chOff x="170370" y="5255447"/>
+            <a:chExt cx="11283961" cy="1679516"/>
           </a:xfrm>
-          <a:prstGeom prst="rightArrow">
-            <a:avLst>
-              <a:gd name="adj1" fmla="val 50000"/>
-              <a:gd name="adj2" fmla="val 103513"/>
-            </a:avLst>
-          </a:prstGeom>
-        </p:spPr>
-        <p:style>
-          <a:lnRef idx="2">
-            <a:schemeClr val="accent1">
-              <a:shade val="50000"/>
-            </a:schemeClr>
-          </a:lnRef>
-          <a:fillRef idx="1">
-            <a:schemeClr val="accent1"/>
-          </a:fillRef>
-          <a:effectRef idx="0">
-            <a:schemeClr val="accent1"/>
-          </a:effectRef>
-          <a:fontRef idx="minor">
-            <a:schemeClr val="lt1"/>
-          </a:fontRef>
-        </p:style>
-        <p:txBody>
-          <a:bodyPr rtlCol="0" anchor="ctr"/>
-          <a:lstStyle/>
-          <a:p>
-            <a:pPr algn="ctr"/>
-            <a:endParaRPr lang="it-IT"/>
-          </a:p>
-        </p:txBody>
-      </p:sp>
-      <p:sp>
-        <p:nvSpPr>
-          <p:cNvPr id="11" name="Freccia in giù 10"/>
-          <p:cNvSpPr/>
-          <p:nvPr/>
-        </p:nvSpPr>
-        <p:spPr>
-          <a:xfrm rot="21276419">
-            <a:off x="9531068" y="2041403"/>
-            <a:ext cx="239074" cy="3006064"/>
-          </a:xfrm>
-          <a:prstGeom prst="downArrow">
-            <a:avLst>
-              <a:gd name="adj1" fmla="val 50000"/>
-              <a:gd name="adj2" fmla="val 65909"/>
-            </a:avLst>
-          </a:prstGeom>
-        </p:spPr>
-        <p:style>
-          <a:lnRef idx="2">
-            <a:schemeClr val="accent1">
-              <a:shade val="50000"/>
-            </a:schemeClr>
-          </a:lnRef>
-          <a:fillRef idx="1">
-            <a:schemeClr val="accent1"/>
-          </a:fillRef>
-          <a:effectRef idx="0">
-            <a:schemeClr val="accent1"/>
-          </a:effectRef>
-          <a:fontRef idx="minor">
-            <a:schemeClr val="lt1"/>
-          </a:fontRef>
-        </p:style>
-        <p:txBody>
-          <a:bodyPr rtlCol="0" anchor="ctr"/>
-          <a:lstStyle/>
-          <a:p>
-            <a:pPr algn="ctr"/>
-            <a:endParaRPr lang="it-IT"/>
-          </a:p>
-        </p:txBody>
-      </p:sp>
-      <p:sp>
-        <p:nvSpPr>
-          <p:cNvPr id="12" name="Freccia a destra 11"/>
-          <p:cNvSpPr/>
-          <p:nvPr/>
-        </p:nvSpPr>
-        <p:spPr>
-          <a:xfrm rot="1219613">
-            <a:off x="6594610" y="923526"/>
-            <a:ext cx="1754408" cy="351276"/>
-          </a:xfrm>
-          <a:prstGeom prst="rightArrow">
-            <a:avLst>
-              <a:gd name="adj1" fmla="val 50000"/>
-              <a:gd name="adj2" fmla="val 100370"/>
-            </a:avLst>
-          </a:prstGeom>
-        </p:spPr>
-        <p:style>
-          <a:lnRef idx="2">
-            <a:schemeClr val="accent1">
-              <a:shade val="50000"/>
-            </a:schemeClr>
-          </a:lnRef>
-          <a:fillRef idx="1">
-            <a:schemeClr val="accent1"/>
-          </a:fillRef>
-          <a:effectRef idx="0">
-            <a:schemeClr val="accent1"/>
-          </a:effectRef>
-          <a:fontRef idx="minor">
-            <a:schemeClr val="lt1"/>
-          </a:fontRef>
-        </p:style>
-        <p:txBody>
-          <a:bodyPr rtlCol="0" anchor="ctr"/>
-          <a:lstStyle/>
-          <a:p>
-            <a:pPr algn="ctr"/>
-            <a:endParaRPr lang="it-IT"/>
-          </a:p>
-        </p:txBody>
-      </p:sp>
-      <p:pic>
-        <p:nvPicPr>
-          <p:cNvPr id="6" name="Immagine 5"/>
-          <p:cNvPicPr>
-            <a:picLocks noChangeAspect="1"/>
-          </p:cNvPicPr>
-          <p:nvPr/>
-        </p:nvPicPr>
-        <p:blipFill>
-          <a:blip r:embed="rId7" cstate="print">
-            <a:extLst>
-              <a:ext uri="{28A0092B-C50C-407E-A947-70E740481C1C}">
-                <a14:useLocalDpi xmlns:a14="http://schemas.microsoft.com/office/drawing/2010/main" val="0"/>
-              </a:ext>
-            </a:extLst>
-          </a:blip>
-          <a:stretch>
-            <a:fillRect/>
-          </a:stretch>
-        </p:blipFill>
-        <p:spPr>
-          <a:xfrm>
-            <a:off x="-268577" y="2233523"/>
-            <a:ext cx="5576767" cy="2468682"/>
-          </a:xfrm>
-          <a:prstGeom prst="rect">
-            <a:avLst/>
-          </a:prstGeom>
-        </p:spPr>
-      </p:pic>
-      <p:sp>
-        <p:nvSpPr>
-          <p:cNvPr id="14" name="CasellaDiTesto 13"/>
-          <p:cNvSpPr txBox="1"/>
-          <p:nvPr/>
-        </p:nvSpPr>
-        <p:spPr>
-          <a:xfrm>
-            <a:off x="1524000" y="-100876"/>
-            <a:ext cx="5656505" cy="523220"/>
-          </a:xfrm>
-          <a:prstGeom prst="rect">
-            <a:avLst/>
-          </a:prstGeom>
-          <a:noFill/>
-        </p:spPr>
-        <p:txBody>
-          <a:bodyPr wrap="square" rtlCol="0">
-            <a:spAutoFit/>
-          </a:bodyPr>
-          <a:lstStyle/>
-          <a:p>
-            <a:pPr algn="ctr"/>
-            <a:r>
-              <a:rPr lang="it-IT" sz="2800" b="1" dirty="0" smtClean="0"/>
-              <a:t>Ricerca Brani Musicali</a:t>
-            </a:r>
-            <a:endParaRPr lang="it-IT" sz="2800" b="1" dirty="0"/>
-          </a:p>
-        </p:txBody>
-      </p:sp>
+        </p:grpSpPr>
+        <p:pic>
+          <p:nvPicPr>
+            <p:cNvPr id="4" name="Immagine 3"/>
+            <p:cNvPicPr>
+              <a:picLocks noChangeAspect="1"/>
+            </p:cNvPicPr>
+            <p:nvPr/>
+          </p:nvPicPr>
+          <p:blipFill>
+            <a:blip r:embed="rId4" cstate="print">
+              <a:extLst>
+                <a:ext uri="{28A0092B-C50C-407E-A947-70E740481C1C}">
+                  <a14:useLocalDpi xmlns:a14="http://schemas.microsoft.com/office/drawing/2010/main" val="0"/>
+                </a:ext>
+              </a:extLst>
+            </a:blip>
+            <a:stretch>
+              <a:fillRect/>
+            </a:stretch>
+          </p:blipFill>
+          <p:spPr>
+            <a:xfrm>
+              <a:off x="170370" y="5255447"/>
+              <a:ext cx="3730682" cy="1679516"/>
+            </a:xfrm>
+            <a:prstGeom prst="rect">
+              <a:avLst/>
+            </a:prstGeom>
+          </p:spPr>
+        </p:pic>
+        <p:pic>
+          <p:nvPicPr>
+            <p:cNvPr id="7" name="Immagine 6"/>
+            <p:cNvPicPr>
+              <a:picLocks noChangeAspect="1"/>
+            </p:cNvPicPr>
+            <p:nvPr/>
+          </p:nvPicPr>
+          <p:blipFill>
+            <a:blip r:embed="rId5"/>
+            <a:stretch>
+              <a:fillRect/>
+            </a:stretch>
+          </p:blipFill>
+          <p:spPr>
+            <a:xfrm>
+              <a:off x="3861467" y="5255447"/>
+              <a:ext cx="3901767" cy="1602553"/>
+            </a:xfrm>
+            <a:prstGeom prst="rect">
+              <a:avLst/>
+            </a:prstGeom>
+          </p:spPr>
+        </p:pic>
+        <p:pic>
+          <p:nvPicPr>
+            <p:cNvPr id="6" name="Immagine 5"/>
+            <p:cNvPicPr>
+              <a:picLocks noChangeAspect="1"/>
+            </p:cNvPicPr>
+            <p:nvPr/>
+          </p:nvPicPr>
+          <p:blipFill>
+            <a:blip r:embed="rId6" cstate="print">
+              <a:extLst>
+                <a:ext uri="{28A0092B-C50C-407E-A947-70E740481C1C}">
+                  <a14:useLocalDpi xmlns:a14="http://schemas.microsoft.com/office/drawing/2010/main" val="0"/>
+                </a:ext>
+              </a:extLst>
+            </a:blip>
+            <a:stretch>
+              <a:fillRect/>
+            </a:stretch>
+          </p:blipFill>
+          <p:spPr>
+            <a:xfrm>
+              <a:off x="7761871" y="5275081"/>
+              <a:ext cx="3692460" cy="1634551"/>
+            </a:xfrm>
+            <a:prstGeom prst="rect">
+              <a:avLst/>
+            </a:prstGeom>
+          </p:spPr>
+        </p:pic>
+      </p:grpSp>
     </p:spTree>
     <p:extLst>
       <p:ext uri="{BB962C8B-B14F-4D97-AF65-F5344CB8AC3E}">
@@ -3740,6 +3540,254 @@
 </file>
 
 <file path=ppt/slides/slide2.xml><?xml version="1.0" encoding="utf-8"?>
+<p:sld xmlns:a="http://schemas.openxmlformats.org/drawingml/2006/main" xmlns:r="http://schemas.openxmlformats.org/officeDocument/2006/relationships" xmlns:p="http://schemas.openxmlformats.org/presentationml/2006/main">
+  <p:cSld>
+    <p:spTree>
+      <p:nvGrpSpPr>
+        <p:cNvPr id="1" name=""/>
+        <p:cNvGrpSpPr/>
+        <p:nvPr/>
+      </p:nvGrpSpPr>
+      <p:grpSpPr>
+        <a:xfrm>
+          <a:off x="0" y="0"/>
+          <a:ext cx="0" cy="0"/>
+          <a:chOff x="0" y="0"/>
+          <a:chExt cx="0" cy="0"/>
+        </a:xfrm>
+      </p:grpSpPr>
+      <p:pic>
+        <p:nvPicPr>
+          <p:cNvPr id="8" name="Immagine 7"/>
+          <p:cNvPicPr>
+            <a:picLocks noChangeAspect="1"/>
+          </p:cNvPicPr>
+          <p:nvPr/>
+        </p:nvPicPr>
+        <p:blipFill>
+          <a:blip r:embed="rId2">
+            <a:extLst>
+              <a:ext uri="{28A0092B-C50C-407E-A947-70E740481C1C}">
+                <a14:useLocalDpi xmlns:a14="http://schemas.microsoft.com/office/drawing/2010/main" val="0"/>
+              </a:ext>
+            </a:extLst>
+          </a:blip>
+          <a:stretch>
+            <a:fillRect/>
+          </a:stretch>
+        </p:blipFill>
+        <p:spPr>
+          <a:xfrm>
+            <a:off x="509375" y="0"/>
+            <a:ext cx="11251057" cy="6300592"/>
+          </a:xfrm>
+          <a:prstGeom prst="rect">
+            <a:avLst/>
+          </a:prstGeom>
+        </p:spPr>
+      </p:pic>
+      <p:sp>
+        <p:nvSpPr>
+          <p:cNvPr id="3" name="Sottotitolo 2"/>
+          <p:cNvSpPr>
+            <a:spLocks noGrp="1"/>
+          </p:cNvSpPr>
+          <p:nvPr>
+            <p:ph type="subTitle" idx="1"/>
+          </p:nvPr>
+        </p:nvSpPr>
+        <p:spPr/>
+        <p:txBody>
+          <a:bodyPr/>
+          <a:lstStyle/>
+          <a:p>
+            <a:endParaRPr lang="it-IT" dirty="0"/>
+          </a:p>
+        </p:txBody>
+      </p:sp>
+      <p:pic>
+        <p:nvPicPr>
+          <p:cNvPr id="9" name="Immagine 8"/>
+          <p:cNvPicPr>
+            <a:picLocks noChangeAspect="1"/>
+          </p:cNvPicPr>
+          <p:nvPr/>
+        </p:nvPicPr>
+        <p:blipFill>
+          <a:blip r:embed="rId3"/>
+          <a:stretch>
+            <a:fillRect/>
+          </a:stretch>
+        </p:blipFill>
+        <p:spPr>
+          <a:xfrm>
+            <a:off x="9630197" y="5037673"/>
+            <a:ext cx="301851" cy="440254"/>
+          </a:xfrm>
+          <a:prstGeom prst="rect">
+            <a:avLst/>
+          </a:prstGeom>
+        </p:spPr>
+      </p:pic>
+      <p:grpSp>
+        <p:nvGrpSpPr>
+          <p:cNvPr id="5" name="Gruppo 4"/>
+          <p:cNvGrpSpPr/>
+          <p:nvPr/>
+        </p:nvGrpSpPr>
+        <p:grpSpPr>
+          <a:xfrm>
+            <a:off x="473621" y="5178484"/>
+            <a:ext cx="11283961" cy="1679516"/>
+            <a:chOff x="170370" y="5255447"/>
+            <a:chExt cx="11283961" cy="1679516"/>
+          </a:xfrm>
+        </p:grpSpPr>
+        <p:pic>
+          <p:nvPicPr>
+            <p:cNvPr id="4" name="Immagine 3"/>
+            <p:cNvPicPr>
+              <a:picLocks noChangeAspect="1"/>
+            </p:cNvPicPr>
+            <p:nvPr/>
+          </p:nvPicPr>
+          <p:blipFill>
+            <a:blip r:embed="rId4" cstate="print">
+              <a:extLst>
+                <a:ext uri="{28A0092B-C50C-407E-A947-70E740481C1C}">
+                  <a14:useLocalDpi xmlns:a14="http://schemas.microsoft.com/office/drawing/2010/main" val="0"/>
+                </a:ext>
+              </a:extLst>
+            </a:blip>
+            <a:stretch>
+              <a:fillRect/>
+            </a:stretch>
+          </p:blipFill>
+          <p:spPr>
+            <a:xfrm>
+              <a:off x="170370" y="5255447"/>
+              <a:ext cx="3730682" cy="1679516"/>
+            </a:xfrm>
+            <a:prstGeom prst="rect">
+              <a:avLst/>
+            </a:prstGeom>
+          </p:spPr>
+        </p:pic>
+        <p:pic>
+          <p:nvPicPr>
+            <p:cNvPr id="7" name="Immagine 6"/>
+            <p:cNvPicPr>
+              <a:picLocks noChangeAspect="1"/>
+            </p:cNvPicPr>
+            <p:nvPr/>
+          </p:nvPicPr>
+          <p:blipFill>
+            <a:blip r:embed="rId5"/>
+            <a:stretch>
+              <a:fillRect/>
+            </a:stretch>
+          </p:blipFill>
+          <p:spPr>
+            <a:xfrm>
+              <a:off x="3861467" y="5255447"/>
+              <a:ext cx="3901767" cy="1602553"/>
+            </a:xfrm>
+            <a:prstGeom prst="rect">
+              <a:avLst/>
+            </a:prstGeom>
+          </p:spPr>
+        </p:pic>
+        <p:pic>
+          <p:nvPicPr>
+            <p:cNvPr id="6" name="Immagine 5"/>
+            <p:cNvPicPr>
+              <a:picLocks noChangeAspect="1"/>
+            </p:cNvPicPr>
+            <p:nvPr/>
+          </p:nvPicPr>
+          <p:blipFill>
+            <a:blip r:embed="rId6" cstate="print">
+              <a:extLst>
+                <a:ext uri="{28A0092B-C50C-407E-A947-70E740481C1C}">
+                  <a14:useLocalDpi xmlns:a14="http://schemas.microsoft.com/office/drawing/2010/main" val="0"/>
+                </a:ext>
+              </a:extLst>
+            </a:blip>
+            <a:stretch>
+              <a:fillRect/>
+            </a:stretch>
+          </p:blipFill>
+          <p:spPr>
+            <a:xfrm>
+              <a:off x="7761871" y="5275081"/>
+              <a:ext cx="3692460" cy="1634551"/>
+            </a:xfrm>
+            <a:prstGeom prst="rect">
+              <a:avLst/>
+            </a:prstGeom>
+          </p:spPr>
+        </p:pic>
+      </p:grpSp>
+      <p:sp>
+        <p:nvSpPr>
+          <p:cNvPr id="14" name="CasellaDiTesto 13"/>
+          <p:cNvSpPr txBox="1"/>
+          <p:nvPr/>
+        </p:nvSpPr>
+        <p:spPr>
+          <a:xfrm>
+            <a:off x="2488504" y="281659"/>
+            <a:ext cx="5656505" cy="523220"/>
+          </a:xfrm>
+          <a:prstGeom prst="rect">
+            <a:avLst/>
+          </a:prstGeom>
+          <a:noFill/>
+        </p:spPr>
+        <p:txBody>
+          <a:bodyPr wrap="square" rtlCol="0">
+            <a:spAutoFit/>
+          </a:bodyPr>
+          <a:lstStyle/>
+          <a:p>
+            <a:pPr algn="ctr"/>
+            <a:r>
+              <a:rPr lang="it-IT" sz="2800" b="1" dirty="0" smtClean="0">
+                <a:solidFill>
+                  <a:srgbClr val="FFC000"/>
+                </a:solidFill>
+              </a:rPr>
+              <a:t>Ricerca Brani Musicali</a:t>
+            </a:r>
+            <a:endParaRPr lang="it-IT" sz="2800" b="1" dirty="0">
+              <a:solidFill>
+                <a:srgbClr val="FFC000"/>
+              </a:solidFill>
+            </a:endParaRPr>
+          </a:p>
+        </p:txBody>
+      </p:sp>
+    </p:spTree>
+    <p:extLst>
+      <p:ext uri="{BB962C8B-B14F-4D97-AF65-F5344CB8AC3E}">
+        <p14:creationId xmlns:p14="http://schemas.microsoft.com/office/powerpoint/2010/main" val="2292102199"/>
+      </p:ext>
+    </p:extLst>
+  </p:cSld>
+  <p:clrMapOvr>
+    <a:masterClrMapping/>
+  </p:clrMapOvr>
+  <p:timing>
+    <p:tnLst>
+      <p:par>
+        <p:cTn id="1" dur="indefinite" restart="never" nodeType="tmRoot"/>
+      </p:par>
+    </p:tnLst>
+  </p:timing>
+</p:sld>
+</file>
+
+<file path=ppt/slides/slide3.xml><?xml version="1.0" encoding="utf-8"?>
 <p:sld xmlns:a="http://schemas.openxmlformats.org/drawingml/2006/main" xmlns:r="http://schemas.openxmlformats.org/officeDocument/2006/relationships" xmlns:p="http://schemas.openxmlformats.org/presentationml/2006/main">
   <p:cSld>
     <p:spTree>

</xml_diff>